<commit_message>
Make space for DJ-08-Login
</commit_message>
<xml_diff>
--- a/lectures/DJ-07-Cookies-Sessions.pptx
+++ b/lectures/DJ-07-Cookies-Sessions.pptx
@@ -226,7 +226,7 @@
           <a:p>
             <a:fld id="{C97B56FC-7D2E-F343-9D09-0D14B00AA564}" type="datetimeFigureOut">
               <a:rPr lang="en-US" smtClean="0"/>
-              <a:t>9/20/19</a:t>
+              <a:t>9/24/19</a:t>
             </a:fld>
             <a:endParaRPr lang="en-US"/>
           </a:p>
@@ -5093,7 +5093,7 @@
           <a:p>
             <a:fld id="{EEE7C04C-7AF8-1445-A186-502B631B934F}" type="datetimeFigureOut">
               <a:rPr lang="en-US" smtClean="0"/>
-              <a:t>9/20/19</a:t>
+              <a:t>9/24/19</a:t>
             </a:fld>
             <a:endParaRPr lang="en-US"/>
           </a:p>
@@ -5258,7 +5258,7 @@
           <a:p>
             <a:fld id="{EEE7C04C-7AF8-1445-A186-502B631B934F}" type="datetimeFigureOut">
               <a:rPr lang="en-US" smtClean="0"/>
-              <a:t>9/20/19</a:t>
+              <a:t>9/24/19</a:t>
             </a:fld>
             <a:endParaRPr lang="en-US"/>
           </a:p>
@@ -5433,7 +5433,7 @@
           <a:p>
             <a:fld id="{EEE7C04C-7AF8-1445-A186-502B631B934F}" type="datetimeFigureOut">
               <a:rPr lang="en-US" smtClean="0"/>
-              <a:t>9/20/19</a:t>
+              <a:t>9/24/19</a:t>
             </a:fld>
             <a:endParaRPr lang="en-US"/>
           </a:p>
@@ -5598,7 +5598,7 @@
           <a:p>
             <a:fld id="{EEE7C04C-7AF8-1445-A186-502B631B934F}" type="datetimeFigureOut">
               <a:rPr lang="en-US" smtClean="0"/>
-              <a:t>9/20/19</a:t>
+              <a:t>9/24/19</a:t>
             </a:fld>
             <a:endParaRPr lang="en-US"/>
           </a:p>
@@ -5839,7 +5839,7 @@
           <a:p>
             <a:fld id="{EEE7C04C-7AF8-1445-A186-502B631B934F}" type="datetimeFigureOut">
               <a:rPr lang="en-US" smtClean="0"/>
-              <a:t>9/20/19</a:t>
+              <a:t>9/24/19</a:t>
             </a:fld>
             <a:endParaRPr lang="en-US"/>
           </a:p>
@@ -6066,7 +6066,7 @@
           <a:p>
             <a:fld id="{EEE7C04C-7AF8-1445-A186-502B631B934F}" type="datetimeFigureOut">
               <a:rPr lang="en-US" smtClean="0"/>
-              <a:t>9/20/19</a:t>
+              <a:t>9/24/19</a:t>
             </a:fld>
             <a:endParaRPr lang="en-US"/>
           </a:p>
@@ -6428,7 +6428,7 @@
           <a:p>
             <a:fld id="{EEE7C04C-7AF8-1445-A186-502B631B934F}" type="datetimeFigureOut">
               <a:rPr lang="en-US" smtClean="0"/>
-              <a:t>9/20/19</a:t>
+              <a:t>9/24/19</a:t>
             </a:fld>
             <a:endParaRPr lang="en-US"/>
           </a:p>
@@ -6541,7 +6541,7 @@
           <a:p>
             <a:fld id="{EEE7C04C-7AF8-1445-A186-502B631B934F}" type="datetimeFigureOut">
               <a:rPr lang="en-US" smtClean="0"/>
-              <a:t>9/20/19</a:t>
+              <a:t>9/24/19</a:t>
             </a:fld>
             <a:endParaRPr lang="en-US"/>
           </a:p>
@@ -6631,7 +6631,7 @@
           <a:p>
             <a:fld id="{EEE7C04C-7AF8-1445-A186-502B631B934F}" type="datetimeFigureOut">
               <a:rPr lang="en-US" smtClean="0"/>
-              <a:t>9/20/19</a:t>
+              <a:t>9/24/19</a:t>
             </a:fld>
             <a:endParaRPr lang="en-US"/>
           </a:p>
@@ -6903,7 +6903,7 @@
           <a:p>
             <a:fld id="{EEE7C04C-7AF8-1445-A186-502B631B934F}" type="datetimeFigureOut">
               <a:rPr lang="en-US" smtClean="0"/>
-              <a:t>9/20/19</a:t>
+              <a:t>9/24/19</a:t>
             </a:fld>
             <a:endParaRPr lang="en-US"/>
           </a:p>
@@ -7155,7 +7155,7 @@
           <a:p>
             <a:fld id="{EEE7C04C-7AF8-1445-A186-502B631B934F}" type="datetimeFigureOut">
               <a:rPr lang="en-US" smtClean="0"/>
-              <a:t>9/20/19</a:t>
+              <a:t>9/24/19</a:t>
             </a:fld>
             <a:endParaRPr lang="en-US"/>
           </a:p>
@@ -7363,7 +7363,7 @@
           <a:p>
             <a:fld id="{EEE7C04C-7AF8-1445-A186-502B631B934F}" type="datetimeFigureOut">
               <a:rPr lang="en-US" smtClean="0"/>
-              <a:t>9/20/19</a:t>
+              <a:t>9/24/19</a:t>
             </a:fld>
             <a:endParaRPr lang="en-US"/>
           </a:p>
@@ -7852,10 +7852,10 @@
           <p:cNvPr id="17" name="Freeform: Shape 16">
             <a:extLst>
               <a:ext uri="{FF2B5EF4-FFF2-40B4-BE49-F238E27FC236}">
-                <a16:creationId xmlns="" xmlns:a16="http://schemas.microsoft.com/office/drawing/2014/main" id="{BCC55ACC-A2F6-403C-A3A4-D59B3734D45F}"/>
+                <a16:creationId xmlns:a16="http://schemas.microsoft.com/office/drawing/2014/main" xmlns="" id="{BCC55ACC-A2F6-403C-A3A4-D59B3734D45F}"/>
               </a:ext>
               <a:ext uri="{C183D7F6-B498-43B3-948B-1728B52AA6E4}">
-                <adec:decorative xmlns="" xmlns:adec="http://schemas.microsoft.com/office/drawing/2017/decorative" val="1"/>
+                <adec:decorative xmlns:adec="http://schemas.microsoft.com/office/drawing/2017/decorative" xmlns="" val="1"/>
               </a:ext>
             </a:extLst>
           </p:cNvPr>
@@ -12438,8 +12438,8 @@
           <a:p>
             <a:pPr algn="r"/>
             <a:r>
-              <a:rPr lang="en-US" dirty="0" err="1" smtClean="0"/>
-              <a:t>DJango</a:t>
+              <a:rPr lang="en-US" dirty="0" smtClean="0"/>
+              <a:t>Django</a:t>
             </a:r>
             <a:endParaRPr lang="en-US" dirty="0"/>
           </a:p>
@@ -16014,8 +16014,8 @@
           <a:p>
             <a:pPr algn="r"/>
             <a:r>
-              <a:rPr lang="en-US" dirty="0" err="1" smtClean="0"/>
-              <a:t>DJango</a:t>
+              <a:rPr lang="en-US" dirty="0" smtClean="0"/>
+              <a:t>Django</a:t>
             </a:r>
             <a:endParaRPr lang="en-US" dirty="0"/>
           </a:p>

</xml_diff>